<commit_message>
add a bash script tp boost start
</commit_message>
<xml_diff>
--- a/A Minimal Over.pptx
+++ b/A Minimal Over.pptx
@@ -3277,9 +3277,60 @@
           </a:p>
         </p:txBody>
       </p:sp>
+      <p:sp>
+        <p:nvSpPr>
+          <p:cNvPr id="5" name="文本框 4"/>
+          <p:cNvSpPr txBox="1"/>
+          <p:nvPr/>
+        </p:nvSpPr>
+        <p:spPr>
+          <a:xfrm>
+            <a:off x="6453505" y="4025265"/>
+            <a:ext cx="5393690" cy="2476500"/>
+          </a:xfrm>
+          <a:prstGeom prst="rect">
+            <a:avLst/>
+          </a:prstGeom>
+          <a:noFill/>
+        </p:spPr>
+        <p:txBody>
+          <a:bodyPr wrap="square" rtlCol="0">
+            <a:noAutofit/>
+          </a:bodyPr>
+          <a:p>
+            <a:pPr algn="ctr"/>
+            <a:r>
+              <a:rPr lang="en-US" altLang="zh-CN" b="1"/>
+              <a:t>TRADE OFF: </a:t>
+            </a:r>
+            <a:endParaRPr lang="en-US" altLang="zh-CN" b="1"/>
+          </a:p>
+          <a:p>
+            <a:r>
+              <a:rPr lang="en-US" altLang="zh-CN"/>
+              <a:t> Prioritized clarity/safety over maximal feature scope</a:t>
+            </a:r>
+            <a:endParaRPr lang="en-US" altLang="zh-CN"/>
+          </a:p>
+          <a:p>
+            <a:r>
+              <a:rPr lang="en-US" altLang="zh-CN"/>
+              <a:t> Added demo mode for deterministic liquidation demos</a:t>
+            </a:r>
+            <a:endParaRPr lang="en-US" altLang="zh-CN"/>
+          </a:p>
+          <a:p>
+            <a:r>
+              <a:rPr lang="en-US" altLang="zh-CN"/>
+              <a:t>  Keeper automation in backend for operational simplicity</a:t>
+            </a:r>
+            <a:endParaRPr lang="en-US" altLang="zh-CN"/>
+          </a:p>
+        </p:txBody>
+      </p:sp>
       <p:pic>
         <p:nvPicPr>
-          <p:cNvPr id="4" name="图片 3" descr="Mermaid"/>
+          <p:cNvPr id="2" name="图片 1"/>
           <p:cNvPicPr>
             <a:picLocks noChangeAspect="1"/>
           </p:cNvPicPr>
@@ -3293,65 +3344,14 @@
         </p:blipFill>
         <p:spPr>
           <a:xfrm>
-            <a:off x="881380" y="608330"/>
-            <a:ext cx="5045710" cy="5686425"/>
+            <a:off x="1012825" y="738505"/>
+            <a:ext cx="4984115" cy="4984115"/>
           </a:xfrm>
           <a:prstGeom prst="rect">
             <a:avLst/>
           </a:prstGeom>
         </p:spPr>
       </p:pic>
-      <p:sp>
-        <p:nvSpPr>
-          <p:cNvPr id="5" name="文本框 4"/>
-          <p:cNvSpPr txBox="1"/>
-          <p:nvPr/>
-        </p:nvSpPr>
-        <p:spPr>
-          <a:xfrm>
-            <a:off x="6453505" y="4025265"/>
-            <a:ext cx="5393690" cy="2476500"/>
-          </a:xfrm>
-          <a:prstGeom prst="rect">
-            <a:avLst/>
-          </a:prstGeom>
-          <a:noFill/>
-        </p:spPr>
-        <p:txBody>
-          <a:bodyPr wrap="square" rtlCol="0">
-            <a:noAutofit/>
-          </a:bodyPr>
-          <a:p>
-            <a:pPr algn="ctr"/>
-            <a:r>
-              <a:rPr lang="en-US" altLang="zh-CN" b="1"/>
-              <a:t>TRADE OFF: </a:t>
-            </a:r>
-            <a:endParaRPr lang="en-US" altLang="zh-CN" b="1"/>
-          </a:p>
-          <a:p>
-            <a:r>
-              <a:rPr lang="en-US" altLang="zh-CN"/>
-              <a:t> Prioritized clarity/safety over maximal feature scope</a:t>
-            </a:r>
-            <a:endParaRPr lang="en-US" altLang="zh-CN"/>
-          </a:p>
-          <a:p>
-            <a:r>
-              <a:rPr lang="en-US" altLang="zh-CN"/>
-              <a:t> Added demo mode for deterministic liquidation demos</a:t>
-            </a:r>
-            <a:endParaRPr lang="en-US" altLang="zh-CN"/>
-          </a:p>
-          <a:p>
-            <a:r>
-              <a:rPr lang="en-US" altLang="zh-CN"/>
-              <a:t>  Keeper automation in backend for operational simplicity</a:t>
-            </a:r>
-            <a:endParaRPr lang="en-US" altLang="zh-CN"/>
-          </a:p>
-        </p:txBody>
-      </p:sp>
     </p:spTree>
     <p:custDataLst>
       <p:tags r:id="rId3"/>

</xml_diff>